<commit_message>
Corrected hw 2 and presentation 3. Added lecture 5
</commit_message>
<xml_diff>
--- a/presentations/03_Core_Services.pptx
+++ b/presentations/03_Core_Services.pptx
@@ -5,7 +5,7 @@
     <p:sldMasterId id="2147483648" r:id="rId1"/>
   </p:sldMasterIdLst>
   <p:notesMasterIdLst>
-    <p:notesMasterId r:id="rId58"/>
+    <p:notesMasterId r:id="rId59"/>
   </p:notesMasterIdLst>
   <p:sldIdLst>
     <p:sldId id="257" r:id="rId2"/>
@@ -57,13 +57,14 @@
     <p:sldId id="329" r:id="rId48"/>
     <p:sldId id="330" r:id="rId49"/>
     <p:sldId id="331" r:id="rId50"/>
-    <p:sldId id="334" r:id="rId51"/>
-    <p:sldId id="332" r:id="rId52"/>
-    <p:sldId id="333" r:id="rId53"/>
-    <p:sldId id="336" r:id="rId54"/>
-    <p:sldId id="325" r:id="rId55"/>
-    <p:sldId id="335" r:id="rId56"/>
-    <p:sldId id="338" r:id="rId57"/>
+    <p:sldId id="339" r:id="rId51"/>
+    <p:sldId id="334" r:id="rId52"/>
+    <p:sldId id="332" r:id="rId53"/>
+    <p:sldId id="333" r:id="rId54"/>
+    <p:sldId id="336" r:id="rId55"/>
+    <p:sldId id="325" r:id="rId56"/>
+    <p:sldId id="335" r:id="rId57"/>
+    <p:sldId id="338" r:id="rId58"/>
   </p:sldIdLst>
   <p:sldSz cx="12192000" cy="6858000"/>
   <p:notesSz cx="6858000" cy="9144000"/>
@@ -260,7 +261,7 @@
           <a:p>
             <a:fld id="{7D3A3C89-A649-45F2-8D71-E2AE9AB3134F}" type="datetimeFigureOut">
               <a:rPr lang="en-US" smtClean="0"/>
-              <a:t>03-Jul-21</a:t>
+              <a:t>22-Jul-21</a:t>
             </a:fld>
             <a:endParaRPr lang="en-US"/>
           </a:p>
@@ -3630,7 +3631,7 @@
           <a:bodyPr/>
           <a:lstStyle/>
           <a:p>
-            <a:fld id="{369589F9-1142-4B1D-9D2D-7C4ED68C6326}" type="slidenum">
+            <a:fld id="{0A2B9863-627E-4AB1-B28C-F8D4F083B0FE}" type="slidenum">
               <a:rPr lang="en-US" smtClean="0"/>
               <a:t>50</a:t>
             </a:fld>
@@ -3641,7 +3642,7 @@
     </p:spTree>
     <p:extLst>
       <p:ext uri="{BB962C8B-B14F-4D97-AF65-F5344CB8AC3E}">
-        <p14:creationId xmlns:p14="http://schemas.microsoft.com/office/powerpoint/2010/main" val="3986024511"/>
+        <p14:creationId xmlns:p14="http://schemas.microsoft.com/office/powerpoint/2010/main" val="2578093707"/>
       </p:ext>
     </p:extLst>
   </p:cSld>
@@ -3779,18 +3780,6 @@
           <a:bodyPr/>
           <a:lstStyle/>
           <a:p>
-            <a:r>
-              <a:rPr lang="en-US" dirty="0"/>
-              <a:t>Event – an action or occurrence often originated asynchronously</a:t>
-            </a:r>
-          </a:p>
-          <a:p>
-            <a:r>
-              <a:rPr lang="en-US" dirty="0"/>
-              <a:t>Event log – persisted immutable sequence of events (append-only, sequential reads, often partitioned)</a:t>
-            </a:r>
-          </a:p>
-          <a:p>
             <a:endParaRPr lang="en-US" dirty="0"/>
           </a:p>
         </p:txBody>
@@ -3810,7 +3799,7 @@
           <a:bodyPr/>
           <a:lstStyle/>
           <a:p>
-            <a:fld id="{0A2B9863-627E-4AB1-B28C-F8D4F083B0FE}" type="slidenum">
+            <a:fld id="{369589F9-1142-4B1D-9D2D-7C4ED68C6326}" type="slidenum">
               <a:rPr lang="en-US" smtClean="0"/>
               <a:t>51</a:t>
             </a:fld>
@@ -3821,7 +3810,7 @@
     </p:spTree>
     <p:extLst>
       <p:ext uri="{BB962C8B-B14F-4D97-AF65-F5344CB8AC3E}">
-        <p14:creationId xmlns:p14="http://schemas.microsoft.com/office/powerpoint/2010/main" val="2759939237"/>
+        <p14:creationId xmlns:p14="http://schemas.microsoft.com/office/powerpoint/2010/main" val="3986024511"/>
       </p:ext>
     </p:extLst>
   </p:cSld>
@@ -3877,14 +3866,17 @@
           <a:p>
             <a:r>
               <a:rPr lang="en-US" dirty="0"/>
-              <a:t>Message – event or command</a:t>
-            </a:r>
-          </a:p>
-          <a:p>
-            <a:r>
-              <a:rPr lang="en-US" dirty="0"/>
-              <a:t>Message could be processed or retries separately. Message is not necessary to process sequentially.</a:t>
-            </a:r>
+              <a:t>Event – an action or occurrence often originated asynchronously</a:t>
+            </a:r>
+          </a:p>
+          <a:p>
+            <a:r>
+              <a:rPr lang="en-US" dirty="0"/>
+              <a:t>Event log – persisted immutable sequence of events (append-only, sequential reads, often partitioned)</a:t>
+            </a:r>
+          </a:p>
+          <a:p>
+            <a:endParaRPr lang="en-US" dirty="0"/>
           </a:p>
         </p:txBody>
       </p:sp>
@@ -3914,7 +3906,7 @@
     </p:spTree>
     <p:extLst>
       <p:ext uri="{BB962C8B-B14F-4D97-AF65-F5344CB8AC3E}">
-        <p14:creationId xmlns:p14="http://schemas.microsoft.com/office/powerpoint/2010/main" val="1749673436"/>
+        <p14:creationId xmlns:p14="http://schemas.microsoft.com/office/powerpoint/2010/main" val="2759939237"/>
       </p:ext>
     </p:extLst>
   </p:cSld>
@@ -3968,7 +3960,16 @@
           <a:bodyPr/>
           <a:lstStyle/>
           <a:p>
-            <a:endParaRPr lang="en-US" dirty="0"/>
+            <a:r>
+              <a:rPr lang="en-US" dirty="0"/>
+              <a:t>Message – event or command</a:t>
+            </a:r>
+          </a:p>
+          <a:p>
+            <a:r>
+              <a:rPr lang="en-US" dirty="0"/>
+              <a:t>Message could be processed or retries separately. Message is not necessary to process sequentially.</a:t>
+            </a:r>
           </a:p>
         </p:txBody>
       </p:sp>
@@ -3987,7 +3988,7 @@
           <a:bodyPr/>
           <a:lstStyle/>
           <a:p>
-            <a:fld id="{369589F9-1142-4B1D-9D2D-7C4ED68C6326}" type="slidenum">
+            <a:fld id="{0A2B9863-627E-4AB1-B28C-F8D4F083B0FE}" type="slidenum">
               <a:rPr lang="en-US" smtClean="0"/>
               <a:t>53</a:t>
             </a:fld>
@@ -3998,7 +3999,7 @@
     </p:spTree>
     <p:extLst>
       <p:ext uri="{BB962C8B-B14F-4D97-AF65-F5344CB8AC3E}">
-        <p14:creationId xmlns:p14="http://schemas.microsoft.com/office/powerpoint/2010/main" val="516866685"/>
+        <p14:creationId xmlns:p14="http://schemas.microsoft.com/office/powerpoint/2010/main" val="1749673436"/>
       </p:ext>
     </p:extLst>
   </p:cSld>
@@ -4082,7 +4083,7 @@
     </p:spTree>
     <p:extLst>
       <p:ext uri="{BB962C8B-B14F-4D97-AF65-F5344CB8AC3E}">
-        <p14:creationId xmlns:p14="http://schemas.microsoft.com/office/powerpoint/2010/main" val="1638932341"/>
+        <p14:creationId xmlns:p14="http://schemas.microsoft.com/office/powerpoint/2010/main" val="516866685"/>
       </p:ext>
     </p:extLst>
   </p:cSld>
@@ -4166,7 +4167,7 @@
     </p:spTree>
     <p:extLst>
       <p:ext uri="{BB962C8B-B14F-4D97-AF65-F5344CB8AC3E}">
-        <p14:creationId xmlns:p14="http://schemas.microsoft.com/office/powerpoint/2010/main" val="2024397714"/>
+        <p14:creationId xmlns:p14="http://schemas.microsoft.com/office/powerpoint/2010/main" val="1638932341"/>
       </p:ext>
     </p:extLst>
   </p:cSld>
@@ -4242,6 +4243,90 @@
             <a:fld id="{369589F9-1142-4B1D-9D2D-7C4ED68C6326}" type="slidenum">
               <a:rPr lang="en-US" smtClean="0"/>
               <a:t>56</a:t>
+            </a:fld>
+            <a:endParaRPr lang="en-US"/>
+          </a:p>
+        </p:txBody>
+      </p:sp>
+    </p:spTree>
+    <p:extLst>
+      <p:ext uri="{BB962C8B-B14F-4D97-AF65-F5344CB8AC3E}">
+        <p14:creationId xmlns:p14="http://schemas.microsoft.com/office/powerpoint/2010/main" val="2024397714"/>
+      </p:ext>
+    </p:extLst>
+  </p:cSld>
+  <p:clrMapOvr>
+    <a:masterClrMapping/>
+  </p:clrMapOvr>
+</p:notes>
+</file>
+
+<file path=ppt/notesSlides/notesSlide46.xml><?xml version="1.0" encoding="utf-8"?>
+<p:notes xmlns:a="http://schemas.openxmlformats.org/drawingml/2006/main" xmlns:r="http://schemas.openxmlformats.org/officeDocument/2006/relationships" xmlns:p="http://schemas.openxmlformats.org/presentationml/2006/main">
+  <p:cSld>
+    <p:spTree>
+      <p:nvGrpSpPr>
+        <p:cNvPr id="1" name=""/>
+        <p:cNvGrpSpPr/>
+        <p:nvPr/>
+      </p:nvGrpSpPr>
+      <p:grpSpPr>
+        <a:xfrm>
+          <a:off x="0" y="0"/>
+          <a:ext cx="0" cy="0"/>
+          <a:chOff x="0" y="0"/>
+          <a:chExt cx="0" cy="0"/>
+        </a:xfrm>
+      </p:grpSpPr>
+      <p:sp>
+        <p:nvSpPr>
+          <p:cNvPr id="2" name="Slide Image Placeholder 1"/>
+          <p:cNvSpPr>
+            <a:spLocks noGrp="1" noRot="1" noChangeAspect="1"/>
+          </p:cNvSpPr>
+          <p:nvPr>
+            <p:ph type="sldImg"/>
+          </p:nvPr>
+        </p:nvSpPr>
+        <p:spPr/>
+      </p:sp>
+      <p:sp>
+        <p:nvSpPr>
+          <p:cNvPr id="3" name="Notes Placeholder 2"/>
+          <p:cNvSpPr>
+            <a:spLocks noGrp="1"/>
+          </p:cNvSpPr>
+          <p:nvPr>
+            <p:ph type="body" idx="1"/>
+          </p:nvPr>
+        </p:nvSpPr>
+        <p:spPr/>
+        <p:txBody>
+          <a:bodyPr/>
+          <a:lstStyle/>
+          <a:p>
+            <a:endParaRPr lang="en-US" dirty="0"/>
+          </a:p>
+        </p:txBody>
+      </p:sp>
+      <p:sp>
+        <p:nvSpPr>
+          <p:cNvPr id="4" name="Slide Number Placeholder 3"/>
+          <p:cNvSpPr>
+            <a:spLocks noGrp="1"/>
+          </p:cNvSpPr>
+          <p:nvPr>
+            <p:ph type="sldNum" sz="quarter" idx="5"/>
+          </p:nvPr>
+        </p:nvSpPr>
+        <p:spPr/>
+        <p:txBody>
+          <a:bodyPr/>
+          <a:lstStyle/>
+          <a:p>
+            <a:fld id="{369589F9-1142-4B1D-9D2D-7C4ED68C6326}" type="slidenum">
+              <a:rPr lang="en-US" smtClean="0"/>
+              <a:t>57</a:t>
             </a:fld>
             <a:endParaRPr lang="en-US"/>
           </a:p>
@@ -4931,7 +5016,7 @@
           <a:p>
             <a:fld id="{0E13C4CA-1FE8-40BD-A7A3-1B8DF1413C47}" type="datetimeFigureOut">
               <a:rPr lang="en-US" smtClean="0"/>
-              <a:t>03-Jul-21</a:t>
+              <a:t>22-Jul-21</a:t>
             </a:fld>
             <a:endParaRPr lang="en-US"/>
           </a:p>
@@ -5129,7 +5214,7 @@
           <a:p>
             <a:fld id="{0E13C4CA-1FE8-40BD-A7A3-1B8DF1413C47}" type="datetimeFigureOut">
               <a:rPr lang="en-US" smtClean="0"/>
-              <a:t>03-Jul-21</a:t>
+              <a:t>22-Jul-21</a:t>
             </a:fld>
             <a:endParaRPr lang="en-US"/>
           </a:p>
@@ -5337,7 +5422,7 @@
           <a:p>
             <a:fld id="{0E13C4CA-1FE8-40BD-A7A3-1B8DF1413C47}" type="datetimeFigureOut">
               <a:rPr lang="en-US" smtClean="0"/>
-              <a:t>03-Jul-21</a:t>
+              <a:t>22-Jul-21</a:t>
             </a:fld>
             <a:endParaRPr lang="en-US"/>
           </a:p>
@@ -5535,7 +5620,7 @@
           <a:p>
             <a:fld id="{0E13C4CA-1FE8-40BD-A7A3-1B8DF1413C47}" type="datetimeFigureOut">
               <a:rPr lang="en-US" smtClean="0"/>
-              <a:t>03-Jul-21</a:t>
+              <a:t>22-Jul-21</a:t>
             </a:fld>
             <a:endParaRPr lang="en-US"/>
           </a:p>
@@ -5810,7 +5895,7 @@
           <a:p>
             <a:fld id="{0E13C4CA-1FE8-40BD-A7A3-1B8DF1413C47}" type="datetimeFigureOut">
               <a:rPr lang="en-US" smtClean="0"/>
-              <a:t>03-Jul-21</a:t>
+              <a:t>22-Jul-21</a:t>
             </a:fld>
             <a:endParaRPr lang="en-US"/>
           </a:p>
@@ -6075,7 +6160,7 @@
           <a:p>
             <a:fld id="{0E13C4CA-1FE8-40BD-A7A3-1B8DF1413C47}" type="datetimeFigureOut">
               <a:rPr lang="en-US" smtClean="0"/>
-              <a:t>03-Jul-21</a:t>
+              <a:t>22-Jul-21</a:t>
             </a:fld>
             <a:endParaRPr lang="en-US"/>
           </a:p>
@@ -6487,7 +6572,7 @@
           <a:p>
             <a:fld id="{0E13C4CA-1FE8-40BD-A7A3-1B8DF1413C47}" type="datetimeFigureOut">
               <a:rPr lang="en-US" smtClean="0"/>
-              <a:t>03-Jul-21</a:t>
+              <a:t>22-Jul-21</a:t>
             </a:fld>
             <a:endParaRPr lang="en-US"/>
           </a:p>
@@ -6628,7 +6713,7 @@
           <a:p>
             <a:fld id="{0E13C4CA-1FE8-40BD-A7A3-1B8DF1413C47}" type="datetimeFigureOut">
               <a:rPr lang="en-US" smtClean="0"/>
-              <a:t>03-Jul-21</a:t>
+              <a:t>22-Jul-21</a:t>
             </a:fld>
             <a:endParaRPr lang="en-US"/>
           </a:p>
@@ -6741,7 +6826,7 @@
           <a:p>
             <a:fld id="{0E13C4CA-1FE8-40BD-A7A3-1B8DF1413C47}" type="datetimeFigureOut">
               <a:rPr lang="en-US" smtClean="0"/>
-              <a:t>03-Jul-21</a:t>
+              <a:t>22-Jul-21</a:t>
             </a:fld>
             <a:endParaRPr lang="en-US"/>
           </a:p>
@@ -7052,7 +7137,7 @@
           <a:p>
             <a:fld id="{0E13C4CA-1FE8-40BD-A7A3-1B8DF1413C47}" type="datetimeFigureOut">
               <a:rPr lang="en-US" smtClean="0"/>
-              <a:t>03-Jul-21</a:t>
+              <a:t>22-Jul-21</a:t>
             </a:fld>
             <a:endParaRPr lang="en-US"/>
           </a:p>
@@ -7340,7 +7425,7 @@
           <a:p>
             <a:fld id="{0E13C4CA-1FE8-40BD-A7A3-1B8DF1413C47}" type="datetimeFigureOut">
               <a:rPr lang="en-US" smtClean="0"/>
-              <a:t>03-Jul-21</a:t>
+              <a:t>22-Jul-21</a:t>
             </a:fld>
             <a:endParaRPr lang="en-US"/>
           </a:p>
@@ -7581,7 +7666,7 @@
           <a:p>
             <a:fld id="{0E13C4CA-1FE8-40BD-A7A3-1B8DF1413C47}" type="datetimeFigureOut">
               <a:rPr lang="en-US" smtClean="0"/>
-              <a:t>03-Jul-21</a:t>
+              <a:t>22-Jul-21</a:t>
             </a:fld>
             <a:endParaRPr lang="en-US"/>
           </a:p>
@@ -15429,49 +15514,19 @@
           <a:chExt cx="0" cy="0"/>
         </a:xfrm>
       </p:grpSpPr>
-      <p:sp>
-        <p:nvSpPr>
-          <p:cNvPr id="2" name="Title 1">
-            <a:extLst>
-              <a:ext uri="{FF2B5EF4-FFF2-40B4-BE49-F238E27FC236}">
-                <a16:creationId xmlns:a16="http://schemas.microsoft.com/office/drawing/2014/main" id="{9439765E-D021-4F83-B075-735F05281BF5}"/>
-              </a:ext>
-            </a:extLst>
-          </p:cNvPr>
-          <p:cNvSpPr>
-            <a:spLocks noGrp="1"/>
-          </p:cNvSpPr>
-          <p:nvPr>
-            <p:ph type="title"/>
-          </p:nvPr>
-        </p:nvSpPr>
-        <p:spPr/>
-        <p:txBody>
-          <a:bodyPr/>
-          <a:lstStyle/>
-          <a:p>
-            <a:r>
-              <a:rPr lang="en-US" dirty="0"/>
-              <a:t>Demo</a:t>
-            </a:r>
-          </a:p>
-        </p:txBody>
-      </p:sp>
       <p:pic>
         <p:nvPicPr>
-          <p:cNvPr id="5" name="Content Placeholder 4" descr="Graphical user interface, application&#10;&#10;Description automatically generated">
-            <a:extLst>
-              <a:ext uri="{FF2B5EF4-FFF2-40B4-BE49-F238E27FC236}">
-                <a16:creationId xmlns:a16="http://schemas.microsoft.com/office/drawing/2014/main" id="{416AC07D-BE93-4D3A-9395-70D15C17B8D6}"/>
+          <p:cNvPr id="8" name="Picture 7" descr="Diagram&#10;&#10;Description automatically generated">
+            <a:extLst>
+              <a:ext uri="{FF2B5EF4-FFF2-40B4-BE49-F238E27FC236}">
+                <a16:creationId xmlns:a16="http://schemas.microsoft.com/office/drawing/2014/main" id="{21C74076-E47C-4768-B6A8-2674E81351FD}"/>
               </a:ext>
             </a:extLst>
           </p:cNvPr>
           <p:cNvPicPr>
-            <a:picLocks noGrp="1" noChangeAspect="1"/>
+            <a:picLocks noChangeAspect="1"/>
           </p:cNvPicPr>
-          <p:nvPr>
-            <p:ph idx="1"/>
-          </p:nvPr>
+          <p:nvPr/>
         </p:nvPicPr>
         <p:blipFill>
           <a:blip r:embed="rId3">
@@ -15487,15 +15542,18 @@
         </p:blipFill>
         <p:spPr>
           <a:xfrm>
-            <a:off x="1520637" y="1690688"/>
-            <a:ext cx="9150725" cy="4284309"/>
+            <a:off x="3710913" y="89878"/>
+            <a:ext cx="4770173" cy="6678243"/>
           </a:xfrm>
+          <a:prstGeom prst="rect">
+            <a:avLst/>
+          </a:prstGeom>
         </p:spPr>
       </p:pic>
     </p:spTree>
     <p:extLst>
       <p:ext uri="{BB962C8B-B14F-4D97-AF65-F5344CB8AC3E}">
-        <p14:creationId xmlns:p14="http://schemas.microsoft.com/office/powerpoint/2010/main" val="2861714891"/>
+        <p14:creationId xmlns:p14="http://schemas.microsoft.com/office/powerpoint/2010/main" val="1301758737"/>
       </p:ext>
     </p:extLst>
   </p:cSld>
@@ -15545,172 +15603,50 @@
           <a:p>
             <a:r>
               <a:rPr lang="en-US" dirty="0"/>
-              <a:t>Events and Messaging</a:t>
-            </a:r>
-          </a:p>
-        </p:txBody>
-      </p:sp>
-      <p:sp>
-        <p:nvSpPr>
-          <p:cNvPr id="3" name="Content Placeholder 2">
-            <a:extLst>
-              <a:ext uri="{FF2B5EF4-FFF2-40B4-BE49-F238E27FC236}">
-                <a16:creationId xmlns:a16="http://schemas.microsoft.com/office/drawing/2014/main" id="{90B61D1A-C399-44DB-9D94-6ED2D23B3306}"/>
-              </a:ext>
-            </a:extLst>
-          </p:cNvPr>
-          <p:cNvSpPr>
-            <a:spLocks noGrp="1"/>
-          </p:cNvSpPr>
+              <a:t>Demo</a:t>
+            </a:r>
+          </a:p>
+        </p:txBody>
+      </p:sp>
+      <p:pic>
+        <p:nvPicPr>
+          <p:cNvPr id="5" name="Content Placeholder 4" descr="Graphical user interface, application&#10;&#10;Description automatically generated">
+            <a:extLst>
+              <a:ext uri="{FF2B5EF4-FFF2-40B4-BE49-F238E27FC236}">
+                <a16:creationId xmlns:a16="http://schemas.microsoft.com/office/drawing/2014/main" id="{416AC07D-BE93-4D3A-9395-70D15C17B8D6}"/>
+              </a:ext>
+            </a:extLst>
+          </p:cNvPr>
+          <p:cNvPicPr>
+            <a:picLocks noGrp="1" noChangeAspect="1"/>
+          </p:cNvPicPr>
           <p:nvPr>
             <p:ph idx="1"/>
           </p:nvPr>
-        </p:nvSpPr>
+        </p:nvPicPr>
+        <p:blipFill>
+          <a:blip r:embed="rId3">
+            <a:extLst>
+              <a:ext uri="{28A0092B-C50C-407E-A947-70E740481C1C}">
+                <a14:useLocalDpi xmlns:a14="http://schemas.microsoft.com/office/drawing/2010/main" val="0"/>
+              </a:ext>
+            </a:extLst>
+          </a:blip>
+          <a:stretch>
+            <a:fillRect/>
+          </a:stretch>
+        </p:blipFill>
         <p:spPr>
           <a:xfrm>
-            <a:off x="838199" y="1825625"/>
-            <a:ext cx="10631905" cy="4351338"/>
+            <a:off x="1520637" y="1690688"/>
+            <a:ext cx="9150725" cy="4284309"/>
           </a:xfrm>
         </p:spPr>
-        <p:txBody>
-          <a:bodyPr/>
-          <a:lstStyle/>
-          <a:p>
-            <a:pPr marL="0" indent="0">
-              <a:buNone/>
-            </a:pPr>
-            <a:r>
-              <a:rPr lang="en-US" dirty="0"/>
-              <a:t>Event streams in cloud</a:t>
-            </a:r>
-          </a:p>
-          <a:p>
-            <a:r>
-              <a:rPr lang="en-US" dirty="0"/>
-              <a:t>Azure:</a:t>
-            </a:r>
-          </a:p>
-          <a:p>
-            <a:pPr lvl="1"/>
-            <a:r>
-              <a:rPr lang="en-US" sz="2000" dirty="0"/>
-              <a:t> </a:t>
-            </a:r>
-            <a:r>
-              <a:rPr lang="en-US" sz="2000" dirty="0">
-                <a:solidFill>
-                  <a:schemeClr val="accent1"/>
-                </a:solidFill>
-              </a:rPr>
-              <a:t>Event Hub</a:t>
-            </a:r>
-            <a:r>
-              <a:rPr lang="en-US" sz="2000" dirty="0"/>
-              <a:t> (compatible with Kafka)</a:t>
-            </a:r>
-          </a:p>
-          <a:p>
-            <a:pPr lvl="1"/>
-            <a:r>
-              <a:rPr lang="en-US" sz="2000" dirty="0"/>
-              <a:t> </a:t>
-            </a:r>
-            <a:r>
-              <a:rPr lang="en-US" sz="2000" dirty="0">
-                <a:solidFill>
-                  <a:schemeClr val="accent1"/>
-                </a:solidFill>
-              </a:rPr>
-              <a:t>Stream Analytics</a:t>
-            </a:r>
-          </a:p>
-          <a:p>
-            <a:r>
-              <a:rPr lang="en-US" dirty="0"/>
-              <a:t>AWS:</a:t>
-            </a:r>
-          </a:p>
-          <a:p>
-            <a:pPr lvl="1"/>
-            <a:r>
-              <a:rPr lang="en-US" sz="2000" dirty="0"/>
-              <a:t> </a:t>
-            </a:r>
-            <a:r>
-              <a:rPr lang="en-US" sz="2000" dirty="0">
-                <a:solidFill>
-                  <a:schemeClr val="accent2"/>
-                </a:solidFill>
-              </a:rPr>
-              <a:t>Amazon Kinesis</a:t>
-            </a:r>
-          </a:p>
-          <a:p>
-            <a:pPr lvl="1"/>
-            <a:r>
-              <a:rPr lang="en-US" sz="2000" dirty="0"/>
-              <a:t> </a:t>
-            </a:r>
-            <a:r>
-              <a:rPr lang="en-US" sz="2000" dirty="0">
-                <a:solidFill>
-                  <a:schemeClr val="accent2"/>
-                </a:solidFill>
-              </a:rPr>
-              <a:t>Managed Streaming for Apache Kafka</a:t>
-            </a:r>
-          </a:p>
-          <a:p>
-            <a:r>
-              <a:rPr lang="en-US" dirty="0"/>
-              <a:t>GCP:</a:t>
-            </a:r>
-            <a:endParaRPr lang="en-US" sz="2000" dirty="0"/>
-          </a:p>
-          <a:p>
-            <a:pPr lvl="1"/>
-            <a:r>
-              <a:rPr lang="en-US" sz="2000" dirty="0"/>
-              <a:t> </a:t>
-            </a:r>
-            <a:r>
-              <a:rPr lang="en-US" sz="2000" dirty="0" err="1">
-                <a:solidFill>
-                  <a:schemeClr val="accent5"/>
-                </a:solidFill>
-              </a:rPr>
-              <a:t>PubSub</a:t>
-            </a:r>
-            <a:endParaRPr lang="en-US" sz="1800" dirty="0"/>
-          </a:p>
-          <a:p>
-            <a:pPr lvl="1"/>
-            <a:r>
-              <a:rPr lang="en-US" sz="2000" dirty="0"/>
-              <a:t> </a:t>
-            </a:r>
-            <a:r>
-              <a:rPr lang="en-US" sz="2000" dirty="0">
-                <a:solidFill>
-                  <a:schemeClr val="accent5"/>
-                </a:solidFill>
-              </a:rPr>
-              <a:t>Dataflow</a:t>
-            </a:r>
-            <a:endParaRPr lang="en-US" sz="2000" dirty="0"/>
-          </a:p>
-          <a:p>
-            <a:pPr marL="0" indent="0">
-              <a:buNone/>
-            </a:pPr>
-            <a:endParaRPr lang="en-US" dirty="0"/>
-          </a:p>
-        </p:txBody>
-      </p:sp>
+      </p:pic>
     </p:spTree>
     <p:extLst>
       <p:ext uri="{BB962C8B-B14F-4D97-AF65-F5344CB8AC3E}">
-        <p14:creationId xmlns:p14="http://schemas.microsoft.com/office/powerpoint/2010/main" val="1605317201"/>
+        <p14:creationId xmlns:p14="http://schemas.microsoft.com/office/powerpoint/2010/main" val="2861714891"/>
       </p:ext>
     </p:extLst>
   </p:cSld>
@@ -15796,6 +15732,221 @@
             </a:pPr>
             <a:r>
               <a:rPr lang="en-US" dirty="0"/>
+              <a:t>Event streams in cloud</a:t>
+            </a:r>
+          </a:p>
+          <a:p>
+            <a:r>
+              <a:rPr lang="en-US" dirty="0"/>
+              <a:t>Azure:</a:t>
+            </a:r>
+          </a:p>
+          <a:p>
+            <a:pPr lvl="1"/>
+            <a:r>
+              <a:rPr lang="en-US" sz="2000" dirty="0"/>
+              <a:t> </a:t>
+            </a:r>
+            <a:r>
+              <a:rPr lang="en-US" sz="2000" dirty="0">
+                <a:solidFill>
+                  <a:schemeClr val="accent1"/>
+                </a:solidFill>
+              </a:rPr>
+              <a:t>Event Hub</a:t>
+            </a:r>
+            <a:r>
+              <a:rPr lang="en-US" sz="2000" dirty="0"/>
+              <a:t> (compatible with Kafka)</a:t>
+            </a:r>
+          </a:p>
+          <a:p>
+            <a:pPr lvl="1"/>
+            <a:r>
+              <a:rPr lang="en-US" sz="2000" dirty="0"/>
+              <a:t> </a:t>
+            </a:r>
+            <a:r>
+              <a:rPr lang="en-US" sz="2000" dirty="0">
+                <a:solidFill>
+                  <a:schemeClr val="accent1"/>
+                </a:solidFill>
+              </a:rPr>
+              <a:t>Stream Analytics</a:t>
+            </a:r>
+          </a:p>
+          <a:p>
+            <a:r>
+              <a:rPr lang="en-US" dirty="0"/>
+              <a:t>AWS:</a:t>
+            </a:r>
+          </a:p>
+          <a:p>
+            <a:pPr lvl="1"/>
+            <a:r>
+              <a:rPr lang="en-US" sz="2000" dirty="0"/>
+              <a:t> </a:t>
+            </a:r>
+            <a:r>
+              <a:rPr lang="en-US" sz="2000" dirty="0">
+                <a:solidFill>
+                  <a:schemeClr val="accent2"/>
+                </a:solidFill>
+              </a:rPr>
+              <a:t>Amazon Kinesis</a:t>
+            </a:r>
+          </a:p>
+          <a:p>
+            <a:pPr lvl="1"/>
+            <a:r>
+              <a:rPr lang="en-US" sz="2000" dirty="0"/>
+              <a:t> </a:t>
+            </a:r>
+            <a:r>
+              <a:rPr lang="en-US" sz="2000" dirty="0">
+                <a:solidFill>
+                  <a:schemeClr val="accent2"/>
+                </a:solidFill>
+              </a:rPr>
+              <a:t>Managed Streaming for Apache Kafka</a:t>
+            </a:r>
+          </a:p>
+          <a:p>
+            <a:r>
+              <a:rPr lang="en-US" dirty="0"/>
+              <a:t>GCP:</a:t>
+            </a:r>
+            <a:endParaRPr lang="en-US" sz="2000" dirty="0"/>
+          </a:p>
+          <a:p>
+            <a:pPr lvl="1"/>
+            <a:r>
+              <a:rPr lang="en-US" sz="2000" dirty="0"/>
+              <a:t> </a:t>
+            </a:r>
+            <a:r>
+              <a:rPr lang="en-US" sz="2000" dirty="0" err="1">
+                <a:solidFill>
+                  <a:schemeClr val="accent5"/>
+                </a:solidFill>
+              </a:rPr>
+              <a:t>PubSub</a:t>
+            </a:r>
+            <a:endParaRPr lang="en-US" sz="1800" dirty="0"/>
+          </a:p>
+          <a:p>
+            <a:pPr lvl="1"/>
+            <a:r>
+              <a:rPr lang="en-US" sz="2000" dirty="0"/>
+              <a:t> </a:t>
+            </a:r>
+            <a:r>
+              <a:rPr lang="en-US" sz="2000" dirty="0">
+                <a:solidFill>
+                  <a:schemeClr val="accent5"/>
+                </a:solidFill>
+              </a:rPr>
+              <a:t>Dataflow</a:t>
+            </a:r>
+            <a:endParaRPr lang="en-US" sz="2000" dirty="0"/>
+          </a:p>
+          <a:p>
+            <a:pPr marL="0" indent="0">
+              <a:buNone/>
+            </a:pPr>
+            <a:endParaRPr lang="en-US" dirty="0"/>
+          </a:p>
+        </p:txBody>
+      </p:sp>
+    </p:spTree>
+    <p:extLst>
+      <p:ext uri="{BB962C8B-B14F-4D97-AF65-F5344CB8AC3E}">
+        <p14:creationId xmlns:p14="http://schemas.microsoft.com/office/powerpoint/2010/main" val="1605317201"/>
+      </p:ext>
+    </p:extLst>
+  </p:cSld>
+  <p:clrMapOvr>
+    <a:masterClrMapping/>
+  </p:clrMapOvr>
+</p:sld>
+</file>
+
+<file path=ppt/slides/slide53.xml><?xml version="1.0" encoding="utf-8"?>
+<p:sld xmlns:a="http://schemas.openxmlformats.org/drawingml/2006/main" xmlns:r="http://schemas.openxmlformats.org/officeDocument/2006/relationships" xmlns:p="http://schemas.openxmlformats.org/presentationml/2006/main">
+  <p:cSld>
+    <p:spTree>
+      <p:nvGrpSpPr>
+        <p:cNvPr id="1" name=""/>
+        <p:cNvGrpSpPr/>
+        <p:nvPr/>
+      </p:nvGrpSpPr>
+      <p:grpSpPr>
+        <a:xfrm>
+          <a:off x="0" y="0"/>
+          <a:ext cx="0" cy="0"/>
+          <a:chOff x="0" y="0"/>
+          <a:chExt cx="0" cy="0"/>
+        </a:xfrm>
+      </p:grpSpPr>
+      <p:sp>
+        <p:nvSpPr>
+          <p:cNvPr id="2" name="Title 1">
+            <a:extLst>
+              <a:ext uri="{FF2B5EF4-FFF2-40B4-BE49-F238E27FC236}">
+                <a16:creationId xmlns:a16="http://schemas.microsoft.com/office/drawing/2014/main" id="{9439765E-D021-4F83-B075-735F05281BF5}"/>
+              </a:ext>
+            </a:extLst>
+          </p:cNvPr>
+          <p:cNvSpPr>
+            <a:spLocks noGrp="1"/>
+          </p:cNvSpPr>
+          <p:nvPr>
+            <p:ph type="title"/>
+          </p:nvPr>
+        </p:nvSpPr>
+        <p:spPr/>
+        <p:txBody>
+          <a:bodyPr/>
+          <a:lstStyle/>
+          <a:p>
+            <a:r>
+              <a:rPr lang="en-US" dirty="0"/>
+              <a:t>Events and Messaging</a:t>
+            </a:r>
+          </a:p>
+        </p:txBody>
+      </p:sp>
+      <p:sp>
+        <p:nvSpPr>
+          <p:cNvPr id="3" name="Content Placeholder 2">
+            <a:extLst>
+              <a:ext uri="{FF2B5EF4-FFF2-40B4-BE49-F238E27FC236}">
+                <a16:creationId xmlns:a16="http://schemas.microsoft.com/office/drawing/2014/main" id="{90B61D1A-C399-44DB-9D94-6ED2D23B3306}"/>
+              </a:ext>
+            </a:extLst>
+          </p:cNvPr>
+          <p:cNvSpPr>
+            <a:spLocks noGrp="1"/>
+          </p:cNvSpPr>
+          <p:nvPr>
+            <p:ph idx="1"/>
+          </p:nvPr>
+        </p:nvSpPr>
+        <p:spPr>
+          <a:xfrm>
+            <a:off x="838199" y="1825625"/>
+            <a:ext cx="10631905" cy="4351338"/>
+          </a:xfrm>
+        </p:spPr>
+        <p:txBody>
+          <a:bodyPr/>
+          <a:lstStyle/>
+          <a:p>
+            <a:pPr marL="0" indent="0">
+              <a:buNone/>
+            </a:pPr>
+            <a:r>
+              <a:rPr lang="en-US" dirty="0"/>
               <a:t>Messaging in cloud</a:t>
             </a:r>
           </a:p>
@@ -15923,7 +16074,7 @@
 </p:sld>
 </file>
 
-<file path=ppt/slides/slide53.xml><?xml version="1.0" encoding="utf-8"?>
+<file path=ppt/slides/slide54.xml><?xml version="1.0" encoding="utf-8"?>
 <p:sld xmlns:a="http://schemas.openxmlformats.org/drawingml/2006/main" xmlns:r="http://schemas.openxmlformats.org/officeDocument/2006/relationships" xmlns:p="http://schemas.openxmlformats.org/presentationml/2006/main">
   <p:cSld>
     <p:spTree>
@@ -16018,141 +16169,6 @@
 </p:sld>
 </file>
 
-<file path=ppt/slides/slide54.xml><?xml version="1.0" encoding="utf-8"?>
-<p:sld xmlns:a="http://schemas.openxmlformats.org/drawingml/2006/main" xmlns:r="http://schemas.openxmlformats.org/officeDocument/2006/relationships" xmlns:p="http://schemas.openxmlformats.org/presentationml/2006/main">
-  <p:cSld>
-    <p:spTree>
-      <p:nvGrpSpPr>
-        <p:cNvPr id="1" name=""/>
-        <p:cNvGrpSpPr/>
-        <p:nvPr/>
-      </p:nvGrpSpPr>
-      <p:grpSpPr>
-        <a:xfrm>
-          <a:off x="0" y="0"/>
-          <a:ext cx="0" cy="0"/>
-          <a:chOff x="0" y="0"/>
-          <a:chExt cx="0" cy="0"/>
-        </a:xfrm>
-      </p:grpSpPr>
-      <p:sp>
-        <p:nvSpPr>
-          <p:cNvPr id="2" name="Title 1">
-            <a:extLst>
-              <a:ext uri="{FF2B5EF4-FFF2-40B4-BE49-F238E27FC236}">
-                <a16:creationId xmlns:a16="http://schemas.microsoft.com/office/drawing/2014/main" id="{E04131E7-91ED-4C32-9ADB-EADE1AE84D6C}"/>
-              </a:ext>
-            </a:extLst>
-          </p:cNvPr>
-          <p:cNvSpPr>
-            <a:spLocks noGrp="1"/>
-          </p:cNvSpPr>
-          <p:nvPr>
-            <p:ph type="title"/>
-          </p:nvPr>
-        </p:nvSpPr>
-        <p:spPr/>
-        <p:txBody>
-          <a:bodyPr/>
-          <a:lstStyle/>
-          <a:p>
-            <a:r>
-              <a:rPr lang="en-US" dirty="0"/>
-              <a:t>Additional resources</a:t>
-            </a:r>
-          </a:p>
-        </p:txBody>
-      </p:sp>
-      <p:sp>
-        <p:nvSpPr>
-          <p:cNvPr id="3" name="Content Placeholder 2">
-            <a:extLst>
-              <a:ext uri="{FF2B5EF4-FFF2-40B4-BE49-F238E27FC236}">
-                <a16:creationId xmlns:a16="http://schemas.microsoft.com/office/drawing/2014/main" id="{5D8B3750-010F-46E9-8CFC-7C148BA0AACB}"/>
-              </a:ext>
-            </a:extLst>
-          </p:cNvPr>
-          <p:cNvSpPr>
-            <a:spLocks noGrp="1"/>
-          </p:cNvSpPr>
-          <p:nvPr>
-            <p:ph idx="1"/>
-          </p:nvPr>
-        </p:nvSpPr>
-        <p:spPr/>
-        <p:txBody>
-          <a:bodyPr>
-            <a:normAutofit/>
-          </a:bodyPr>
-          <a:lstStyle/>
-          <a:p>
-            <a:r>
-              <a:rPr lang="en-US" dirty="0"/>
-              <a:t>(video) </a:t>
-            </a:r>
-            <a:r>
-              <a:rPr lang="en-US" dirty="0">
-                <a:hlinkClick r:id="rId3"/>
-              </a:rPr>
-              <a:t>Safe Client Behavior</a:t>
-            </a:r>
-            <a:endParaRPr lang="en-US" dirty="0"/>
-          </a:p>
-          <a:p>
-            <a:r>
-              <a:rPr lang="en-US" dirty="0"/>
-              <a:t>(article) </a:t>
-            </a:r>
-            <a:r>
-              <a:rPr lang="en-US" dirty="0">
-                <a:hlinkClick r:id="rId4"/>
-              </a:rPr>
-              <a:t>What happens on DNS update</a:t>
-            </a:r>
-            <a:endParaRPr lang="en-US" dirty="0"/>
-          </a:p>
-          <a:p>
-            <a:r>
-              <a:rPr lang="en-US" dirty="0"/>
-              <a:t>(video) </a:t>
-            </a:r>
-            <a:r>
-              <a:rPr lang="en-US" dirty="0">
-                <a:hlinkClick r:id="rId5"/>
-              </a:rPr>
-              <a:t>DynamoDB design-patterns</a:t>
-            </a:r>
-            <a:r>
-              <a:rPr lang="en-US" dirty="0"/>
-              <a:t> (applies to most “</a:t>
-            </a:r>
-            <a:r>
-              <a:rPr lang="en-US" dirty="0" err="1"/>
-              <a:t>nosql</a:t>
-            </a:r>
-            <a:r>
-              <a:rPr lang="en-US" dirty="0"/>
-              <a:t>”)</a:t>
-            </a:r>
-          </a:p>
-          <a:p>
-            <a:endParaRPr lang="en-US" dirty="0"/>
-          </a:p>
-        </p:txBody>
-      </p:sp>
-    </p:spTree>
-    <p:extLst>
-      <p:ext uri="{BB962C8B-B14F-4D97-AF65-F5344CB8AC3E}">
-        <p14:creationId xmlns:p14="http://schemas.microsoft.com/office/powerpoint/2010/main" val="728140776"/>
-      </p:ext>
-    </p:extLst>
-  </p:cSld>
-  <p:clrMapOvr>
-    <a:masterClrMapping/>
-  </p:clrMapOvr>
-</p:sld>
-</file>
-
 <file path=ppt/slides/slide55.xml><?xml version="1.0" encoding="utf-8"?>
 <p:sld xmlns:a="http://schemas.openxmlformats.org/drawingml/2006/main" xmlns:r="http://schemas.openxmlformats.org/officeDocument/2006/relationships" xmlns:p="http://schemas.openxmlformats.org/presentationml/2006/main">
   <p:cSld>
@@ -16193,6 +16209,141 @@
           <a:p>
             <a:r>
               <a:rPr lang="en-US" dirty="0"/>
+              <a:t>Additional resources</a:t>
+            </a:r>
+          </a:p>
+        </p:txBody>
+      </p:sp>
+      <p:sp>
+        <p:nvSpPr>
+          <p:cNvPr id="3" name="Content Placeholder 2">
+            <a:extLst>
+              <a:ext uri="{FF2B5EF4-FFF2-40B4-BE49-F238E27FC236}">
+                <a16:creationId xmlns:a16="http://schemas.microsoft.com/office/drawing/2014/main" id="{5D8B3750-010F-46E9-8CFC-7C148BA0AACB}"/>
+              </a:ext>
+            </a:extLst>
+          </p:cNvPr>
+          <p:cNvSpPr>
+            <a:spLocks noGrp="1"/>
+          </p:cNvSpPr>
+          <p:nvPr>
+            <p:ph idx="1"/>
+          </p:nvPr>
+        </p:nvSpPr>
+        <p:spPr/>
+        <p:txBody>
+          <a:bodyPr>
+            <a:normAutofit/>
+          </a:bodyPr>
+          <a:lstStyle/>
+          <a:p>
+            <a:r>
+              <a:rPr lang="en-US" dirty="0"/>
+              <a:t>(video) </a:t>
+            </a:r>
+            <a:r>
+              <a:rPr lang="en-US" dirty="0">
+                <a:hlinkClick r:id="rId3"/>
+              </a:rPr>
+              <a:t>Safe Client Behavior</a:t>
+            </a:r>
+            <a:endParaRPr lang="en-US" dirty="0"/>
+          </a:p>
+          <a:p>
+            <a:r>
+              <a:rPr lang="en-US" dirty="0"/>
+              <a:t>(article) </a:t>
+            </a:r>
+            <a:r>
+              <a:rPr lang="en-US" dirty="0">
+                <a:hlinkClick r:id="rId4"/>
+              </a:rPr>
+              <a:t>What happens on DNS update</a:t>
+            </a:r>
+            <a:endParaRPr lang="en-US" dirty="0"/>
+          </a:p>
+          <a:p>
+            <a:r>
+              <a:rPr lang="en-US" dirty="0"/>
+              <a:t>(video) </a:t>
+            </a:r>
+            <a:r>
+              <a:rPr lang="en-US" dirty="0">
+                <a:hlinkClick r:id="rId5"/>
+              </a:rPr>
+              <a:t>DynamoDB design-patterns</a:t>
+            </a:r>
+            <a:r>
+              <a:rPr lang="en-US" dirty="0"/>
+              <a:t> (applies to most “</a:t>
+            </a:r>
+            <a:r>
+              <a:rPr lang="en-US" dirty="0" err="1"/>
+              <a:t>nosql</a:t>
+            </a:r>
+            <a:r>
+              <a:rPr lang="en-US" dirty="0"/>
+              <a:t>”)</a:t>
+            </a:r>
+          </a:p>
+          <a:p>
+            <a:endParaRPr lang="en-US" dirty="0"/>
+          </a:p>
+        </p:txBody>
+      </p:sp>
+    </p:spTree>
+    <p:extLst>
+      <p:ext uri="{BB962C8B-B14F-4D97-AF65-F5344CB8AC3E}">
+        <p14:creationId xmlns:p14="http://schemas.microsoft.com/office/powerpoint/2010/main" val="728140776"/>
+      </p:ext>
+    </p:extLst>
+  </p:cSld>
+  <p:clrMapOvr>
+    <a:masterClrMapping/>
+  </p:clrMapOvr>
+</p:sld>
+</file>
+
+<file path=ppt/slides/slide56.xml><?xml version="1.0" encoding="utf-8"?>
+<p:sld xmlns:a="http://schemas.openxmlformats.org/drawingml/2006/main" xmlns:r="http://schemas.openxmlformats.org/officeDocument/2006/relationships" xmlns:p="http://schemas.openxmlformats.org/presentationml/2006/main">
+  <p:cSld>
+    <p:spTree>
+      <p:nvGrpSpPr>
+        <p:cNvPr id="1" name=""/>
+        <p:cNvGrpSpPr/>
+        <p:nvPr/>
+      </p:nvGrpSpPr>
+      <p:grpSpPr>
+        <a:xfrm>
+          <a:off x="0" y="0"/>
+          <a:ext cx="0" cy="0"/>
+          <a:chOff x="0" y="0"/>
+          <a:chExt cx="0" cy="0"/>
+        </a:xfrm>
+      </p:grpSpPr>
+      <p:sp>
+        <p:nvSpPr>
+          <p:cNvPr id="2" name="Title 1">
+            <a:extLst>
+              <a:ext uri="{FF2B5EF4-FFF2-40B4-BE49-F238E27FC236}">
+                <a16:creationId xmlns:a16="http://schemas.microsoft.com/office/drawing/2014/main" id="{E04131E7-91ED-4C32-9ADB-EADE1AE84D6C}"/>
+              </a:ext>
+            </a:extLst>
+          </p:cNvPr>
+          <p:cNvSpPr>
+            <a:spLocks noGrp="1"/>
+          </p:cNvSpPr>
+          <p:nvPr>
+            <p:ph type="title"/>
+          </p:nvPr>
+        </p:nvSpPr>
+        <p:spPr/>
+        <p:txBody>
+          <a:bodyPr/>
+          <a:lstStyle/>
+          <a:p>
+            <a:r>
+              <a:rPr lang="en-US" dirty="0"/>
               <a:t>Additional resources (optional)</a:t>
             </a:r>
           </a:p>
@@ -16290,7 +16441,7 @@
 </p:sld>
 </file>
 
-<file path=ppt/slides/slide56.xml><?xml version="1.0" encoding="utf-8"?>
+<file path=ppt/slides/slide57.xml><?xml version="1.0" encoding="utf-8"?>
 <p:sld xmlns:a="http://schemas.openxmlformats.org/drawingml/2006/main" xmlns:r="http://schemas.openxmlformats.org/officeDocument/2006/relationships" xmlns:p="http://schemas.openxmlformats.org/presentationml/2006/main">
   <p:cSld>
     <p:spTree>

</xml_diff>

<commit_message>
2022 Review lectures and demos
</commit_message>
<xml_diff>
--- a/presentations/03_Core_Services.pptx
+++ b/presentations/03_Core_Services.pptx
@@ -5,7 +5,7 @@
     <p:sldMasterId id="2147483648" r:id="rId1"/>
   </p:sldMasterIdLst>
   <p:notesMasterIdLst>
-    <p:notesMasterId r:id="rId60"/>
+    <p:notesMasterId r:id="rId61"/>
   </p:notesMasterIdLst>
   <p:sldIdLst>
     <p:sldId id="257" r:id="rId2"/>
@@ -63,9 +63,10 @@
     <p:sldId id="332" r:id="rId54"/>
     <p:sldId id="333" r:id="rId55"/>
     <p:sldId id="336" r:id="rId56"/>
-    <p:sldId id="325" r:id="rId57"/>
-    <p:sldId id="335" r:id="rId58"/>
-    <p:sldId id="338" r:id="rId59"/>
+    <p:sldId id="341" r:id="rId57"/>
+    <p:sldId id="325" r:id="rId58"/>
+    <p:sldId id="335" r:id="rId59"/>
+    <p:sldId id="338" r:id="rId60"/>
   </p:sldIdLst>
   <p:sldSz cx="12192000" cy="6858000"/>
   <p:notesSz cx="6858000" cy="9144000"/>
@@ -262,7 +263,7 @@
           <a:p>
             <a:fld id="{7D3A3C89-A649-45F2-8D71-E2AE9AB3134F}" type="datetimeFigureOut">
               <a:rPr lang="en-US" smtClean="0"/>
-              <a:t>02-Feb-22</a:t>
+              <a:t>10-Feb-22</a:t>
             </a:fld>
             <a:endParaRPr lang="en-US"/>
           </a:p>
@@ -4277,7 +4278,7 @@
     </p:spTree>
     <p:extLst>
       <p:ext uri="{BB962C8B-B14F-4D97-AF65-F5344CB8AC3E}">
-        <p14:creationId xmlns:p14="http://schemas.microsoft.com/office/powerpoint/2010/main" val="1638932341"/>
+        <p14:creationId xmlns:p14="http://schemas.microsoft.com/office/powerpoint/2010/main" val="805842527"/>
       </p:ext>
     </p:extLst>
   </p:cSld>
@@ -4361,7 +4362,7 @@
     </p:spTree>
     <p:extLst>
       <p:ext uri="{BB962C8B-B14F-4D97-AF65-F5344CB8AC3E}">
-        <p14:creationId xmlns:p14="http://schemas.microsoft.com/office/powerpoint/2010/main" val="2024397714"/>
+        <p14:creationId xmlns:p14="http://schemas.microsoft.com/office/powerpoint/2010/main" val="1638932341"/>
       </p:ext>
     </p:extLst>
   </p:cSld>
@@ -4437,6 +4438,90 @@
             <a:fld id="{369589F9-1142-4B1D-9D2D-7C4ED68C6326}" type="slidenum">
               <a:rPr lang="en-US" smtClean="0"/>
               <a:t>58</a:t>
+            </a:fld>
+            <a:endParaRPr lang="en-US"/>
+          </a:p>
+        </p:txBody>
+      </p:sp>
+    </p:spTree>
+    <p:extLst>
+      <p:ext uri="{BB962C8B-B14F-4D97-AF65-F5344CB8AC3E}">
+        <p14:creationId xmlns:p14="http://schemas.microsoft.com/office/powerpoint/2010/main" val="2024397714"/>
+      </p:ext>
+    </p:extLst>
+  </p:cSld>
+  <p:clrMapOvr>
+    <a:masterClrMapping/>
+  </p:clrMapOvr>
+</p:notes>
+</file>
+
+<file path=ppt/notesSlides/notesSlide48.xml><?xml version="1.0" encoding="utf-8"?>
+<p:notes xmlns:a="http://schemas.openxmlformats.org/drawingml/2006/main" xmlns:r="http://schemas.openxmlformats.org/officeDocument/2006/relationships" xmlns:p="http://schemas.openxmlformats.org/presentationml/2006/main">
+  <p:cSld>
+    <p:spTree>
+      <p:nvGrpSpPr>
+        <p:cNvPr id="1" name=""/>
+        <p:cNvGrpSpPr/>
+        <p:nvPr/>
+      </p:nvGrpSpPr>
+      <p:grpSpPr>
+        <a:xfrm>
+          <a:off x="0" y="0"/>
+          <a:ext cx="0" cy="0"/>
+          <a:chOff x="0" y="0"/>
+          <a:chExt cx="0" cy="0"/>
+        </a:xfrm>
+      </p:grpSpPr>
+      <p:sp>
+        <p:nvSpPr>
+          <p:cNvPr id="2" name="Slide Image Placeholder 1"/>
+          <p:cNvSpPr>
+            <a:spLocks noGrp="1" noRot="1" noChangeAspect="1"/>
+          </p:cNvSpPr>
+          <p:nvPr>
+            <p:ph type="sldImg"/>
+          </p:nvPr>
+        </p:nvSpPr>
+        <p:spPr/>
+      </p:sp>
+      <p:sp>
+        <p:nvSpPr>
+          <p:cNvPr id="3" name="Notes Placeholder 2"/>
+          <p:cNvSpPr>
+            <a:spLocks noGrp="1"/>
+          </p:cNvSpPr>
+          <p:nvPr>
+            <p:ph type="body" idx="1"/>
+          </p:nvPr>
+        </p:nvSpPr>
+        <p:spPr/>
+        <p:txBody>
+          <a:bodyPr/>
+          <a:lstStyle/>
+          <a:p>
+            <a:endParaRPr lang="en-US" dirty="0"/>
+          </a:p>
+        </p:txBody>
+      </p:sp>
+      <p:sp>
+        <p:nvSpPr>
+          <p:cNvPr id="4" name="Slide Number Placeholder 3"/>
+          <p:cNvSpPr>
+            <a:spLocks noGrp="1"/>
+          </p:cNvSpPr>
+          <p:nvPr>
+            <p:ph type="sldNum" sz="quarter" idx="5"/>
+          </p:nvPr>
+        </p:nvSpPr>
+        <p:spPr/>
+        <p:txBody>
+          <a:bodyPr/>
+          <a:lstStyle/>
+          <a:p>
+            <a:fld id="{369589F9-1142-4B1D-9D2D-7C4ED68C6326}" type="slidenum">
+              <a:rPr lang="en-US" smtClean="0"/>
+              <a:t>59</a:t>
             </a:fld>
             <a:endParaRPr lang="en-US"/>
           </a:p>
@@ -5126,7 +5211,7 @@
           <a:p>
             <a:fld id="{0E13C4CA-1FE8-40BD-A7A3-1B8DF1413C47}" type="datetimeFigureOut">
               <a:rPr lang="en-US" smtClean="0"/>
-              <a:t>02-Feb-22</a:t>
+              <a:t>10-Feb-22</a:t>
             </a:fld>
             <a:endParaRPr lang="en-US"/>
           </a:p>
@@ -5324,7 +5409,7 @@
           <a:p>
             <a:fld id="{0E13C4CA-1FE8-40BD-A7A3-1B8DF1413C47}" type="datetimeFigureOut">
               <a:rPr lang="en-US" smtClean="0"/>
-              <a:t>02-Feb-22</a:t>
+              <a:t>10-Feb-22</a:t>
             </a:fld>
             <a:endParaRPr lang="en-US"/>
           </a:p>
@@ -5532,7 +5617,7 @@
           <a:p>
             <a:fld id="{0E13C4CA-1FE8-40BD-A7A3-1B8DF1413C47}" type="datetimeFigureOut">
               <a:rPr lang="en-US" smtClean="0"/>
-              <a:t>02-Feb-22</a:t>
+              <a:t>10-Feb-22</a:t>
             </a:fld>
             <a:endParaRPr lang="en-US"/>
           </a:p>
@@ -5730,7 +5815,7 @@
           <a:p>
             <a:fld id="{0E13C4CA-1FE8-40BD-A7A3-1B8DF1413C47}" type="datetimeFigureOut">
               <a:rPr lang="en-US" smtClean="0"/>
-              <a:t>02-Feb-22</a:t>
+              <a:t>10-Feb-22</a:t>
             </a:fld>
             <a:endParaRPr lang="en-US"/>
           </a:p>
@@ -6005,7 +6090,7 @@
           <a:p>
             <a:fld id="{0E13C4CA-1FE8-40BD-A7A3-1B8DF1413C47}" type="datetimeFigureOut">
               <a:rPr lang="en-US" smtClean="0"/>
-              <a:t>02-Feb-22</a:t>
+              <a:t>10-Feb-22</a:t>
             </a:fld>
             <a:endParaRPr lang="en-US"/>
           </a:p>
@@ -6270,7 +6355,7 @@
           <a:p>
             <a:fld id="{0E13C4CA-1FE8-40BD-A7A3-1B8DF1413C47}" type="datetimeFigureOut">
               <a:rPr lang="en-US" smtClean="0"/>
-              <a:t>02-Feb-22</a:t>
+              <a:t>10-Feb-22</a:t>
             </a:fld>
             <a:endParaRPr lang="en-US"/>
           </a:p>
@@ -6682,7 +6767,7 @@
           <a:p>
             <a:fld id="{0E13C4CA-1FE8-40BD-A7A3-1B8DF1413C47}" type="datetimeFigureOut">
               <a:rPr lang="en-US" smtClean="0"/>
-              <a:t>02-Feb-22</a:t>
+              <a:t>10-Feb-22</a:t>
             </a:fld>
             <a:endParaRPr lang="en-US"/>
           </a:p>
@@ -6823,7 +6908,7 @@
           <a:p>
             <a:fld id="{0E13C4CA-1FE8-40BD-A7A3-1B8DF1413C47}" type="datetimeFigureOut">
               <a:rPr lang="en-US" smtClean="0"/>
-              <a:t>02-Feb-22</a:t>
+              <a:t>10-Feb-22</a:t>
             </a:fld>
             <a:endParaRPr lang="en-US"/>
           </a:p>
@@ -6936,7 +7021,7 @@
           <a:p>
             <a:fld id="{0E13C4CA-1FE8-40BD-A7A3-1B8DF1413C47}" type="datetimeFigureOut">
               <a:rPr lang="en-US" smtClean="0"/>
-              <a:t>02-Feb-22</a:t>
+              <a:t>10-Feb-22</a:t>
             </a:fld>
             <a:endParaRPr lang="en-US"/>
           </a:p>
@@ -7247,7 +7332,7 @@
           <a:p>
             <a:fld id="{0E13C4CA-1FE8-40BD-A7A3-1B8DF1413C47}" type="datetimeFigureOut">
               <a:rPr lang="en-US" smtClean="0"/>
-              <a:t>02-Feb-22</a:t>
+              <a:t>10-Feb-22</a:t>
             </a:fld>
             <a:endParaRPr lang="en-US"/>
           </a:p>
@@ -7535,7 +7620,7 @@
           <a:p>
             <a:fld id="{0E13C4CA-1FE8-40BD-A7A3-1B8DF1413C47}" type="datetimeFigureOut">
               <a:rPr lang="en-US" smtClean="0"/>
-              <a:t>02-Feb-22</a:t>
+              <a:t>10-Feb-22</a:t>
             </a:fld>
             <a:endParaRPr lang="en-US"/>
           </a:p>
@@ -7776,7 +7861,7 @@
           <a:p>
             <a:fld id="{0E13C4CA-1FE8-40BD-A7A3-1B8DF1413C47}" type="datetimeFigureOut">
               <a:rPr lang="en-US" smtClean="0"/>
-              <a:t>02-Feb-22</a:t>
+              <a:t>10-Feb-22</a:t>
             </a:fld>
             <a:endParaRPr lang="en-US"/>
           </a:p>
@@ -16374,7 +16459,7 @@
           <p:cNvPr id="2" name="Title 1">
             <a:extLst>
               <a:ext uri="{FF2B5EF4-FFF2-40B4-BE49-F238E27FC236}">
-                <a16:creationId xmlns:a16="http://schemas.microsoft.com/office/drawing/2014/main" id="{E04131E7-91ED-4C32-9ADB-EADE1AE84D6C}"/>
+                <a16:creationId xmlns:a16="http://schemas.microsoft.com/office/drawing/2014/main" id="{9439765E-D021-4F83-B075-735F05281BF5}"/>
               </a:ext>
             </a:extLst>
           </p:cNvPr>
@@ -16391,85 +16476,124 @@
           <a:lstStyle/>
           <a:p>
             <a:r>
-              <a:rPr lang="en-US" dirty="0"/>
-              <a:t>Additional resources</a:t>
-            </a:r>
-          </a:p>
-        </p:txBody>
-      </p:sp>
-      <p:sp>
-        <p:nvSpPr>
-          <p:cNvPr id="3" name="Content Placeholder 2">
-            <a:extLst>
-              <a:ext uri="{FF2B5EF4-FFF2-40B4-BE49-F238E27FC236}">
-                <a16:creationId xmlns:a16="http://schemas.microsoft.com/office/drawing/2014/main" id="{5D8B3750-010F-46E9-8CFC-7C148BA0AACB}"/>
-              </a:ext>
-            </a:extLst>
-          </p:cNvPr>
-          <p:cNvSpPr>
-            <a:spLocks noGrp="1"/>
-          </p:cNvSpPr>
-          <p:nvPr>
-            <p:ph idx="1"/>
-          </p:nvPr>
-        </p:nvSpPr>
-        <p:spPr/>
-        <p:txBody>
-          <a:bodyPr>
-            <a:normAutofit/>
+              <a:rPr lang="en-US"/>
+              <a:t>Demo</a:t>
+            </a:r>
+            <a:endParaRPr lang="en-US" dirty="0"/>
+          </a:p>
+        </p:txBody>
+      </p:sp>
+      <p:pic>
+        <p:nvPicPr>
+          <p:cNvPr id="1026" name="Picture 2" descr="Image">
+            <a:extLst>
+              <a:ext uri="{FF2B5EF4-FFF2-40B4-BE49-F238E27FC236}">
+                <a16:creationId xmlns:a16="http://schemas.microsoft.com/office/drawing/2014/main" id="{4CEFD59E-1ADB-4B05-8945-6973AE109E8A}"/>
+              </a:ext>
+            </a:extLst>
+          </p:cNvPr>
+          <p:cNvPicPr>
+            <a:picLocks noChangeAspect="1" noChangeArrowheads="1"/>
+          </p:cNvPicPr>
+          <p:nvPr/>
+        </p:nvPicPr>
+        <p:blipFill>
+          <a:blip r:embed="rId3">
+            <a:extLst>
+              <a:ext uri="{28A0092B-C50C-407E-A947-70E740481C1C}">
+                <a14:useLocalDpi xmlns:a14="http://schemas.microsoft.com/office/drawing/2010/main" val="0"/>
+              </a:ext>
+            </a:extLst>
+          </a:blip>
+          <a:srcRect/>
+          <a:stretch>
+            <a:fillRect/>
+          </a:stretch>
+        </p:blipFill>
+        <p:spPr bwMode="auto">
+          <a:xfrm>
+            <a:off x="7768794" y="1250778"/>
+            <a:ext cx="2982031" cy="5242097"/>
+          </a:xfrm>
+          <a:prstGeom prst="rect">
+            <a:avLst/>
+          </a:prstGeom>
+          <a:noFill/>
+          <a:extLst>
+            <a:ext uri="{909E8E84-426E-40DD-AFC4-6F175D3DCCD1}">
+              <a14:hiddenFill xmlns:a14="http://schemas.microsoft.com/office/drawing/2010/main">
+                <a:solidFill>
+                  <a:srgbClr val="FFFFFF"/>
+                </a:solidFill>
+              </a14:hiddenFill>
+            </a:ext>
+          </a:extLst>
+        </p:spPr>
+      </p:pic>
+      <p:pic>
+        <p:nvPicPr>
+          <p:cNvPr id="7" name="Picture 6">
+            <a:extLst>
+              <a:ext uri="{FF2B5EF4-FFF2-40B4-BE49-F238E27FC236}">
+                <a16:creationId xmlns:a16="http://schemas.microsoft.com/office/drawing/2014/main" id="{B2A837E9-A80A-4968-A6C8-61F161724008}"/>
+              </a:ext>
+            </a:extLst>
+          </p:cNvPr>
+          <p:cNvPicPr>
+            <a:picLocks noChangeAspect="1"/>
+          </p:cNvPicPr>
+          <p:nvPr/>
+        </p:nvPicPr>
+        <p:blipFill>
+          <a:blip r:embed="rId4"/>
+          <a:stretch>
+            <a:fillRect/>
+          </a:stretch>
+        </p:blipFill>
+        <p:spPr>
+          <a:xfrm>
+            <a:off x="1441175" y="2266848"/>
+            <a:ext cx="5540220" cy="2324301"/>
+          </a:xfrm>
+          <a:prstGeom prst="rect">
+            <a:avLst/>
+          </a:prstGeom>
+        </p:spPr>
+      </p:pic>
+      <p:sp>
+        <p:nvSpPr>
+          <p:cNvPr id="10" name="TextBox 9">
+            <a:extLst>
+              <a:ext uri="{FF2B5EF4-FFF2-40B4-BE49-F238E27FC236}">
+                <a16:creationId xmlns:a16="http://schemas.microsoft.com/office/drawing/2014/main" id="{DA2D625D-12DF-4BEB-B2F6-889320D32814}"/>
+              </a:ext>
+            </a:extLst>
+          </p:cNvPr>
+          <p:cNvSpPr txBox="1"/>
+          <p:nvPr/>
+        </p:nvSpPr>
+        <p:spPr>
+          <a:xfrm>
+            <a:off x="953128" y="6123543"/>
+            <a:ext cx="6516314" cy="369332"/>
+          </a:xfrm>
+          <a:prstGeom prst="rect">
+            <a:avLst/>
+          </a:prstGeom>
+          <a:noFill/>
+        </p:spPr>
+        <p:txBody>
+          <a:bodyPr wrap="square">
+            <a:spAutoFit/>
           </a:bodyPr>
           <a:lstStyle/>
           <a:p>
-            <a:r>
-              <a:rPr lang="en-US" dirty="0"/>
-              <a:t>(video) </a:t>
-            </a:r>
-            <a:r>
-              <a:rPr lang="en-US" dirty="0">
-                <a:hlinkClick r:id="rId3"/>
-              </a:rPr>
-              <a:t>Safe Client Behavior</a:t>
-            </a:r>
-            <a:endParaRPr lang="en-US" dirty="0"/>
-          </a:p>
-          <a:p>
-            <a:r>
-              <a:rPr lang="en-US" dirty="0"/>
-              <a:t>(comics) </a:t>
-            </a:r>
-            <a:r>
-              <a:rPr lang="en-US" dirty="0">
-                <a:hlinkClick r:id="rId4"/>
-              </a:rPr>
-              <a:t>Networking basics by Julia Evans</a:t>
-            </a:r>
-            <a:endParaRPr lang="en-US" dirty="0"/>
-          </a:p>
-          <a:p>
-            <a:r>
-              <a:rPr lang="en-US" dirty="0"/>
-              <a:t>(video) </a:t>
-            </a:r>
             <a:r>
               <a:rPr lang="en-US" dirty="0">
                 <a:hlinkClick r:id="rId5"/>
               </a:rPr>
-              <a:t>DynamoDB design-patterns</a:t>
-            </a:r>
-            <a:r>
-              <a:rPr lang="en-US" dirty="0"/>
-              <a:t> (applies to most “</a:t>
-            </a:r>
-            <a:r>
-              <a:rPr lang="en-US" dirty="0" err="1"/>
-              <a:t>nosql</a:t>
-            </a:r>
-            <a:r>
-              <a:rPr lang="en-US" dirty="0"/>
-              <a:t>”)</a:t>
-            </a:r>
-          </a:p>
-          <a:p>
+              <a:t>https://twitter.com/MarcJBrooker/status/1489651911640825858</a:t>
+            </a:r>
             <a:endParaRPr lang="en-US" dirty="0"/>
           </a:p>
         </p:txBody>
@@ -16477,7 +16601,7 @@
     </p:spTree>
     <p:extLst>
       <p:ext uri="{BB962C8B-B14F-4D97-AF65-F5344CB8AC3E}">
-        <p14:creationId xmlns:p14="http://schemas.microsoft.com/office/powerpoint/2010/main" val="728140776"/>
+        <p14:creationId xmlns:p14="http://schemas.microsoft.com/office/powerpoint/2010/main" val="3271489353"/>
       </p:ext>
     </p:extLst>
   </p:cSld>
@@ -16527,6 +16651,141 @@
           <a:p>
             <a:r>
               <a:rPr lang="en-US" dirty="0"/>
+              <a:t>Additional resources</a:t>
+            </a:r>
+          </a:p>
+        </p:txBody>
+      </p:sp>
+      <p:sp>
+        <p:nvSpPr>
+          <p:cNvPr id="3" name="Content Placeholder 2">
+            <a:extLst>
+              <a:ext uri="{FF2B5EF4-FFF2-40B4-BE49-F238E27FC236}">
+                <a16:creationId xmlns:a16="http://schemas.microsoft.com/office/drawing/2014/main" id="{5D8B3750-010F-46E9-8CFC-7C148BA0AACB}"/>
+              </a:ext>
+            </a:extLst>
+          </p:cNvPr>
+          <p:cNvSpPr>
+            <a:spLocks noGrp="1"/>
+          </p:cNvSpPr>
+          <p:nvPr>
+            <p:ph idx="1"/>
+          </p:nvPr>
+        </p:nvSpPr>
+        <p:spPr/>
+        <p:txBody>
+          <a:bodyPr>
+            <a:normAutofit/>
+          </a:bodyPr>
+          <a:lstStyle/>
+          <a:p>
+            <a:r>
+              <a:rPr lang="en-US" dirty="0"/>
+              <a:t>(video) </a:t>
+            </a:r>
+            <a:r>
+              <a:rPr lang="en-US" dirty="0">
+                <a:hlinkClick r:id="rId3"/>
+              </a:rPr>
+              <a:t>Safe Client Behavior</a:t>
+            </a:r>
+            <a:endParaRPr lang="en-US" dirty="0"/>
+          </a:p>
+          <a:p>
+            <a:r>
+              <a:rPr lang="en-US" dirty="0"/>
+              <a:t>(comics) </a:t>
+            </a:r>
+            <a:r>
+              <a:rPr lang="en-US" dirty="0">
+                <a:hlinkClick r:id="rId4"/>
+              </a:rPr>
+              <a:t>Networking basics by Julia Evans</a:t>
+            </a:r>
+            <a:endParaRPr lang="en-US" dirty="0"/>
+          </a:p>
+          <a:p>
+            <a:r>
+              <a:rPr lang="en-US" dirty="0"/>
+              <a:t>(video) </a:t>
+            </a:r>
+            <a:r>
+              <a:rPr lang="en-US" dirty="0">
+                <a:hlinkClick r:id="rId5"/>
+              </a:rPr>
+              <a:t>DynamoDB design-patterns</a:t>
+            </a:r>
+            <a:r>
+              <a:rPr lang="en-US" dirty="0"/>
+              <a:t> (applies to most “</a:t>
+            </a:r>
+            <a:r>
+              <a:rPr lang="en-US" dirty="0" err="1"/>
+              <a:t>nosql</a:t>
+            </a:r>
+            <a:r>
+              <a:rPr lang="en-US" dirty="0"/>
+              <a:t>”)</a:t>
+            </a:r>
+          </a:p>
+          <a:p>
+            <a:endParaRPr lang="en-US" dirty="0"/>
+          </a:p>
+        </p:txBody>
+      </p:sp>
+    </p:spTree>
+    <p:extLst>
+      <p:ext uri="{BB962C8B-B14F-4D97-AF65-F5344CB8AC3E}">
+        <p14:creationId xmlns:p14="http://schemas.microsoft.com/office/powerpoint/2010/main" val="728140776"/>
+      </p:ext>
+    </p:extLst>
+  </p:cSld>
+  <p:clrMapOvr>
+    <a:masterClrMapping/>
+  </p:clrMapOvr>
+</p:sld>
+</file>
+
+<file path=ppt/slides/slide58.xml><?xml version="1.0" encoding="utf-8"?>
+<p:sld xmlns:a="http://schemas.openxmlformats.org/drawingml/2006/main" xmlns:r="http://schemas.openxmlformats.org/officeDocument/2006/relationships" xmlns:p="http://schemas.openxmlformats.org/presentationml/2006/main">
+  <p:cSld>
+    <p:spTree>
+      <p:nvGrpSpPr>
+        <p:cNvPr id="1" name=""/>
+        <p:cNvGrpSpPr/>
+        <p:nvPr/>
+      </p:nvGrpSpPr>
+      <p:grpSpPr>
+        <a:xfrm>
+          <a:off x="0" y="0"/>
+          <a:ext cx="0" cy="0"/>
+          <a:chOff x="0" y="0"/>
+          <a:chExt cx="0" cy="0"/>
+        </a:xfrm>
+      </p:grpSpPr>
+      <p:sp>
+        <p:nvSpPr>
+          <p:cNvPr id="2" name="Title 1">
+            <a:extLst>
+              <a:ext uri="{FF2B5EF4-FFF2-40B4-BE49-F238E27FC236}">
+                <a16:creationId xmlns:a16="http://schemas.microsoft.com/office/drawing/2014/main" id="{E04131E7-91ED-4C32-9ADB-EADE1AE84D6C}"/>
+              </a:ext>
+            </a:extLst>
+          </p:cNvPr>
+          <p:cNvSpPr>
+            <a:spLocks noGrp="1"/>
+          </p:cNvSpPr>
+          <p:nvPr>
+            <p:ph type="title"/>
+          </p:nvPr>
+        </p:nvSpPr>
+        <p:spPr/>
+        <p:txBody>
+          <a:bodyPr/>
+          <a:lstStyle/>
+          <a:p>
+            <a:r>
+              <a:rPr lang="en-US" dirty="0"/>
               <a:t>Additional resources (optional)</a:t>
             </a:r>
           </a:p>
@@ -16637,7 +16896,7 @@
 </p:sld>
 </file>
 
-<file path=ppt/slides/slide58.xml><?xml version="1.0" encoding="utf-8"?>
+<file path=ppt/slides/slide59.xml><?xml version="1.0" encoding="utf-8"?>
 <p:sld xmlns:a="http://schemas.openxmlformats.org/drawingml/2006/main" xmlns:r="http://schemas.openxmlformats.org/officeDocument/2006/relationships" xmlns:p="http://schemas.openxmlformats.org/presentationml/2006/main">
   <p:cSld>
     <p:spTree>

</xml_diff>

<commit_message>
Core Services: presentation upgrade
</commit_message>
<xml_diff>
--- a/presentations/03_Core_Services.pptx
+++ b/presentations/03_Core_Services.pptx
@@ -263,7 +263,7 @@
           <a:p>
             <a:fld id="{7D3A3C89-A649-45F2-8D71-E2AE9AB3134F}" type="datetimeFigureOut">
               <a:rPr lang="en-US" smtClean="0"/>
-              <a:t>15-Apr-22</a:t>
+              <a:t>26-Apr-22</a:t>
             </a:fld>
             <a:endParaRPr lang="en-US"/>
           </a:p>
@@ -5211,7 +5211,7 @@
           <a:p>
             <a:fld id="{0E13C4CA-1FE8-40BD-A7A3-1B8DF1413C47}" type="datetimeFigureOut">
               <a:rPr lang="en-US" smtClean="0"/>
-              <a:t>15-Apr-22</a:t>
+              <a:t>26-Apr-22</a:t>
             </a:fld>
             <a:endParaRPr lang="en-US"/>
           </a:p>
@@ -5409,7 +5409,7 @@
           <a:p>
             <a:fld id="{0E13C4CA-1FE8-40BD-A7A3-1B8DF1413C47}" type="datetimeFigureOut">
               <a:rPr lang="en-US" smtClean="0"/>
-              <a:t>15-Apr-22</a:t>
+              <a:t>26-Apr-22</a:t>
             </a:fld>
             <a:endParaRPr lang="en-US"/>
           </a:p>
@@ -5617,7 +5617,7 @@
           <a:p>
             <a:fld id="{0E13C4CA-1FE8-40BD-A7A3-1B8DF1413C47}" type="datetimeFigureOut">
               <a:rPr lang="en-US" smtClean="0"/>
-              <a:t>15-Apr-22</a:t>
+              <a:t>26-Apr-22</a:t>
             </a:fld>
             <a:endParaRPr lang="en-US"/>
           </a:p>
@@ -5815,7 +5815,7 @@
           <a:p>
             <a:fld id="{0E13C4CA-1FE8-40BD-A7A3-1B8DF1413C47}" type="datetimeFigureOut">
               <a:rPr lang="en-US" smtClean="0"/>
-              <a:t>15-Apr-22</a:t>
+              <a:t>26-Apr-22</a:t>
             </a:fld>
             <a:endParaRPr lang="en-US"/>
           </a:p>
@@ -6090,7 +6090,7 @@
           <a:p>
             <a:fld id="{0E13C4CA-1FE8-40BD-A7A3-1B8DF1413C47}" type="datetimeFigureOut">
               <a:rPr lang="en-US" smtClean="0"/>
-              <a:t>15-Apr-22</a:t>
+              <a:t>26-Apr-22</a:t>
             </a:fld>
             <a:endParaRPr lang="en-US"/>
           </a:p>
@@ -6355,7 +6355,7 @@
           <a:p>
             <a:fld id="{0E13C4CA-1FE8-40BD-A7A3-1B8DF1413C47}" type="datetimeFigureOut">
               <a:rPr lang="en-US" smtClean="0"/>
-              <a:t>15-Apr-22</a:t>
+              <a:t>26-Apr-22</a:t>
             </a:fld>
             <a:endParaRPr lang="en-US"/>
           </a:p>
@@ -6767,7 +6767,7 @@
           <a:p>
             <a:fld id="{0E13C4CA-1FE8-40BD-A7A3-1B8DF1413C47}" type="datetimeFigureOut">
               <a:rPr lang="en-US" smtClean="0"/>
-              <a:t>15-Apr-22</a:t>
+              <a:t>26-Apr-22</a:t>
             </a:fld>
             <a:endParaRPr lang="en-US"/>
           </a:p>
@@ -6908,7 +6908,7 @@
           <a:p>
             <a:fld id="{0E13C4CA-1FE8-40BD-A7A3-1B8DF1413C47}" type="datetimeFigureOut">
               <a:rPr lang="en-US" smtClean="0"/>
-              <a:t>15-Apr-22</a:t>
+              <a:t>26-Apr-22</a:t>
             </a:fld>
             <a:endParaRPr lang="en-US"/>
           </a:p>
@@ -7021,7 +7021,7 @@
           <a:p>
             <a:fld id="{0E13C4CA-1FE8-40BD-A7A3-1B8DF1413C47}" type="datetimeFigureOut">
               <a:rPr lang="en-US" smtClean="0"/>
-              <a:t>15-Apr-22</a:t>
+              <a:t>26-Apr-22</a:t>
             </a:fld>
             <a:endParaRPr lang="en-US"/>
           </a:p>
@@ -7332,7 +7332,7 @@
           <a:p>
             <a:fld id="{0E13C4CA-1FE8-40BD-A7A3-1B8DF1413C47}" type="datetimeFigureOut">
               <a:rPr lang="en-US" smtClean="0"/>
-              <a:t>15-Apr-22</a:t>
+              <a:t>26-Apr-22</a:t>
             </a:fld>
             <a:endParaRPr lang="en-US"/>
           </a:p>
@@ -7620,7 +7620,7 @@
           <a:p>
             <a:fld id="{0E13C4CA-1FE8-40BD-A7A3-1B8DF1413C47}" type="datetimeFigureOut">
               <a:rPr lang="en-US" smtClean="0"/>
-              <a:t>15-Apr-22</a:t>
+              <a:t>26-Apr-22</a:t>
             </a:fld>
             <a:endParaRPr lang="en-US"/>
           </a:p>
@@ -7861,7 +7861,7 @@
           <a:p>
             <a:fld id="{0E13C4CA-1FE8-40BD-A7A3-1B8DF1413C47}" type="datetimeFigureOut">
               <a:rPr lang="en-US" smtClean="0"/>
-              <a:t>15-Apr-22</a:t>
+              <a:t>26-Apr-22</a:t>
             </a:fld>
             <a:endParaRPr lang="en-US"/>
           </a:p>
@@ -11740,7 +11740,7 @@
           <a:p>
             <a:r>
               <a:rPr lang="en-US" dirty="0"/>
-              <a:t>Cloud is not really a network, but it provides networking services</a:t>
+              <a:t>Cloud does not offer a physical network, but it provides networking services</a:t>
             </a:r>
           </a:p>
           <a:p>
@@ -12753,7 +12753,7 @@
           <p:nvPr>
             <p:extLst>
               <p:ext uri="{D42A27DB-BD31-4B8C-83A1-F6EECF244321}">
-                <p14:modId xmlns:p14="http://schemas.microsoft.com/office/powerpoint/2010/main" val="1831796002"/>
+                <p14:modId xmlns:p14="http://schemas.microsoft.com/office/powerpoint/2010/main" val="2250168256"/>
               </p:ext>
             </p:extLst>
           </p:nvPr>
@@ -16454,35 +16454,6 @@
           <a:chExt cx="0" cy="0"/>
         </a:xfrm>
       </p:grpSpPr>
-      <p:sp>
-        <p:nvSpPr>
-          <p:cNvPr id="2" name="Title 1">
-            <a:extLst>
-              <a:ext uri="{FF2B5EF4-FFF2-40B4-BE49-F238E27FC236}">
-                <a16:creationId xmlns:a16="http://schemas.microsoft.com/office/drawing/2014/main" id="{9439765E-D021-4F83-B075-735F05281BF5}"/>
-              </a:ext>
-            </a:extLst>
-          </p:cNvPr>
-          <p:cNvSpPr>
-            <a:spLocks noGrp="1"/>
-          </p:cNvSpPr>
-          <p:nvPr>
-            <p:ph type="title"/>
-          </p:nvPr>
-        </p:nvSpPr>
-        <p:spPr/>
-        <p:txBody>
-          <a:bodyPr/>
-          <a:lstStyle/>
-          <a:p>
-            <a:r>
-              <a:rPr lang="en-US"/>
-              <a:t>Demo</a:t>
-            </a:r>
-            <a:endParaRPr lang="en-US" dirty="0"/>
-          </a:p>
-        </p:txBody>
-      </p:sp>
       <p:pic>
         <p:nvPicPr>
           <p:cNvPr id="1026" name="Picture 2" descr="Image">

</xml_diff>

<commit_message>
Minor correction to Core Services presentation
</commit_message>
<xml_diff>
--- a/presentations/03_Core_Services.pptx
+++ b/presentations/03_Core_Services.pptx
@@ -263,7 +263,7 @@
           <a:p>
             <a:fld id="{7D3A3C89-A649-45F2-8D71-E2AE9AB3134F}" type="datetimeFigureOut">
               <a:rPr lang="en-US" smtClean="0"/>
-              <a:t>26-Apr-22</a:t>
+              <a:t>04-May-22</a:t>
             </a:fld>
             <a:endParaRPr lang="en-US"/>
           </a:p>
@@ -5211,7 +5211,7 @@
           <a:p>
             <a:fld id="{0E13C4CA-1FE8-40BD-A7A3-1B8DF1413C47}" type="datetimeFigureOut">
               <a:rPr lang="en-US" smtClean="0"/>
-              <a:t>26-Apr-22</a:t>
+              <a:t>04-May-22</a:t>
             </a:fld>
             <a:endParaRPr lang="en-US"/>
           </a:p>
@@ -5409,7 +5409,7 @@
           <a:p>
             <a:fld id="{0E13C4CA-1FE8-40BD-A7A3-1B8DF1413C47}" type="datetimeFigureOut">
               <a:rPr lang="en-US" smtClean="0"/>
-              <a:t>26-Apr-22</a:t>
+              <a:t>04-May-22</a:t>
             </a:fld>
             <a:endParaRPr lang="en-US"/>
           </a:p>
@@ -5617,7 +5617,7 @@
           <a:p>
             <a:fld id="{0E13C4CA-1FE8-40BD-A7A3-1B8DF1413C47}" type="datetimeFigureOut">
               <a:rPr lang="en-US" smtClean="0"/>
-              <a:t>26-Apr-22</a:t>
+              <a:t>04-May-22</a:t>
             </a:fld>
             <a:endParaRPr lang="en-US"/>
           </a:p>
@@ -5815,7 +5815,7 @@
           <a:p>
             <a:fld id="{0E13C4CA-1FE8-40BD-A7A3-1B8DF1413C47}" type="datetimeFigureOut">
               <a:rPr lang="en-US" smtClean="0"/>
-              <a:t>26-Apr-22</a:t>
+              <a:t>04-May-22</a:t>
             </a:fld>
             <a:endParaRPr lang="en-US"/>
           </a:p>
@@ -6090,7 +6090,7 @@
           <a:p>
             <a:fld id="{0E13C4CA-1FE8-40BD-A7A3-1B8DF1413C47}" type="datetimeFigureOut">
               <a:rPr lang="en-US" smtClean="0"/>
-              <a:t>26-Apr-22</a:t>
+              <a:t>04-May-22</a:t>
             </a:fld>
             <a:endParaRPr lang="en-US"/>
           </a:p>
@@ -6355,7 +6355,7 @@
           <a:p>
             <a:fld id="{0E13C4CA-1FE8-40BD-A7A3-1B8DF1413C47}" type="datetimeFigureOut">
               <a:rPr lang="en-US" smtClean="0"/>
-              <a:t>26-Apr-22</a:t>
+              <a:t>04-May-22</a:t>
             </a:fld>
             <a:endParaRPr lang="en-US"/>
           </a:p>
@@ -6767,7 +6767,7 @@
           <a:p>
             <a:fld id="{0E13C4CA-1FE8-40BD-A7A3-1B8DF1413C47}" type="datetimeFigureOut">
               <a:rPr lang="en-US" smtClean="0"/>
-              <a:t>26-Apr-22</a:t>
+              <a:t>04-May-22</a:t>
             </a:fld>
             <a:endParaRPr lang="en-US"/>
           </a:p>
@@ -6908,7 +6908,7 @@
           <a:p>
             <a:fld id="{0E13C4CA-1FE8-40BD-A7A3-1B8DF1413C47}" type="datetimeFigureOut">
               <a:rPr lang="en-US" smtClean="0"/>
-              <a:t>26-Apr-22</a:t>
+              <a:t>04-May-22</a:t>
             </a:fld>
             <a:endParaRPr lang="en-US"/>
           </a:p>
@@ -7021,7 +7021,7 @@
           <a:p>
             <a:fld id="{0E13C4CA-1FE8-40BD-A7A3-1B8DF1413C47}" type="datetimeFigureOut">
               <a:rPr lang="en-US" smtClean="0"/>
-              <a:t>26-Apr-22</a:t>
+              <a:t>04-May-22</a:t>
             </a:fld>
             <a:endParaRPr lang="en-US"/>
           </a:p>
@@ -7332,7 +7332,7 @@
           <a:p>
             <a:fld id="{0E13C4CA-1FE8-40BD-A7A3-1B8DF1413C47}" type="datetimeFigureOut">
               <a:rPr lang="en-US" smtClean="0"/>
-              <a:t>26-Apr-22</a:t>
+              <a:t>04-May-22</a:t>
             </a:fld>
             <a:endParaRPr lang="en-US"/>
           </a:p>
@@ -7620,7 +7620,7 @@
           <a:p>
             <a:fld id="{0E13C4CA-1FE8-40BD-A7A3-1B8DF1413C47}" type="datetimeFigureOut">
               <a:rPr lang="en-US" smtClean="0"/>
-              <a:t>26-Apr-22</a:t>
+              <a:t>04-May-22</a:t>
             </a:fld>
             <a:endParaRPr lang="en-US"/>
           </a:p>
@@ -7861,7 +7861,7 @@
           <a:p>
             <a:fld id="{0E13C4CA-1FE8-40BD-A7A3-1B8DF1413C47}" type="datetimeFigureOut">
               <a:rPr lang="en-US" smtClean="0"/>
-              <a:t>26-Apr-22</a:t>
+              <a:t>04-May-22</a:t>
             </a:fld>
             <a:endParaRPr lang="en-US"/>
           </a:p>
@@ -15911,6 +15911,48 @@
           </a:xfrm>
         </p:spPr>
       </p:pic>
+      <p:sp>
+        <p:nvSpPr>
+          <p:cNvPr id="6" name="TextBox 5">
+            <a:extLst>
+              <a:ext uri="{FF2B5EF4-FFF2-40B4-BE49-F238E27FC236}">
+                <a16:creationId xmlns:a16="http://schemas.microsoft.com/office/drawing/2014/main" id="{264E6029-EA7B-B022-0CDA-6E64B1BE4551}"/>
+              </a:ext>
+            </a:extLst>
+          </p:cNvPr>
+          <p:cNvSpPr txBox="1"/>
+          <p:nvPr/>
+        </p:nvSpPr>
+        <p:spPr>
+          <a:xfrm>
+            <a:off x="3048000" y="3105835"/>
+            <a:ext cx="6096000" cy="646331"/>
+          </a:xfrm>
+          <a:prstGeom prst="rect">
+            <a:avLst/>
+          </a:prstGeom>
+          <a:noFill/>
+        </p:spPr>
+        <p:txBody>
+          <a:bodyPr wrap="square">
+            <a:spAutoFit/>
+          </a:bodyPr>
+          <a:lstStyle/>
+          <a:p>
+            <a:endParaRPr lang="en-US" dirty="0">
+              <a:hlinkClick r:id="rId4"/>
+            </a:endParaRPr>
+          </a:p>
+          <a:p>
+            <a:r>
+              <a:rPr lang="en-US" dirty="0">
+                <a:hlinkClick r:id="rId4"/>
+              </a:rPr>
+              <a:t>Connected devices</a:t>
+            </a:r>
+          </a:p>
+        </p:txBody>
+      </p:sp>
     </p:spTree>
     <p:extLst>
       <p:ext uri="{BB962C8B-B14F-4D97-AF65-F5344CB8AC3E}">

</xml_diff>

<commit_message>
Adding tags to faas TF; az_func corrections
</commit_message>
<xml_diff>
--- a/presentations/03_Core_Services.pptx
+++ b/presentations/03_Core_Services.pptx
@@ -263,7 +263,7 @@
           <a:p>
             <a:fld id="{7D3A3C89-A649-45F2-8D71-E2AE9AB3134F}" type="datetimeFigureOut">
               <a:rPr lang="en-US" smtClean="0"/>
-              <a:t>04-May-22</a:t>
+              <a:t>12-May-22</a:t>
             </a:fld>
             <a:endParaRPr lang="en-US"/>
           </a:p>
@@ -5211,7 +5211,7 @@
           <a:p>
             <a:fld id="{0E13C4CA-1FE8-40BD-A7A3-1B8DF1413C47}" type="datetimeFigureOut">
               <a:rPr lang="en-US" smtClean="0"/>
-              <a:t>04-May-22</a:t>
+              <a:t>12-May-22</a:t>
             </a:fld>
             <a:endParaRPr lang="en-US"/>
           </a:p>
@@ -5409,7 +5409,7 @@
           <a:p>
             <a:fld id="{0E13C4CA-1FE8-40BD-A7A3-1B8DF1413C47}" type="datetimeFigureOut">
               <a:rPr lang="en-US" smtClean="0"/>
-              <a:t>04-May-22</a:t>
+              <a:t>12-May-22</a:t>
             </a:fld>
             <a:endParaRPr lang="en-US"/>
           </a:p>
@@ -5617,7 +5617,7 @@
           <a:p>
             <a:fld id="{0E13C4CA-1FE8-40BD-A7A3-1B8DF1413C47}" type="datetimeFigureOut">
               <a:rPr lang="en-US" smtClean="0"/>
-              <a:t>04-May-22</a:t>
+              <a:t>12-May-22</a:t>
             </a:fld>
             <a:endParaRPr lang="en-US"/>
           </a:p>
@@ -5815,7 +5815,7 @@
           <a:p>
             <a:fld id="{0E13C4CA-1FE8-40BD-A7A3-1B8DF1413C47}" type="datetimeFigureOut">
               <a:rPr lang="en-US" smtClean="0"/>
-              <a:t>04-May-22</a:t>
+              <a:t>12-May-22</a:t>
             </a:fld>
             <a:endParaRPr lang="en-US"/>
           </a:p>
@@ -6090,7 +6090,7 @@
           <a:p>
             <a:fld id="{0E13C4CA-1FE8-40BD-A7A3-1B8DF1413C47}" type="datetimeFigureOut">
               <a:rPr lang="en-US" smtClean="0"/>
-              <a:t>04-May-22</a:t>
+              <a:t>12-May-22</a:t>
             </a:fld>
             <a:endParaRPr lang="en-US"/>
           </a:p>
@@ -6355,7 +6355,7 @@
           <a:p>
             <a:fld id="{0E13C4CA-1FE8-40BD-A7A3-1B8DF1413C47}" type="datetimeFigureOut">
               <a:rPr lang="en-US" smtClean="0"/>
-              <a:t>04-May-22</a:t>
+              <a:t>12-May-22</a:t>
             </a:fld>
             <a:endParaRPr lang="en-US"/>
           </a:p>
@@ -6767,7 +6767,7 @@
           <a:p>
             <a:fld id="{0E13C4CA-1FE8-40BD-A7A3-1B8DF1413C47}" type="datetimeFigureOut">
               <a:rPr lang="en-US" smtClean="0"/>
-              <a:t>04-May-22</a:t>
+              <a:t>12-May-22</a:t>
             </a:fld>
             <a:endParaRPr lang="en-US"/>
           </a:p>
@@ -6908,7 +6908,7 @@
           <a:p>
             <a:fld id="{0E13C4CA-1FE8-40BD-A7A3-1B8DF1413C47}" type="datetimeFigureOut">
               <a:rPr lang="en-US" smtClean="0"/>
-              <a:t>04-May-22</a:t>
+              <a:t>12-May-22</a:t>
             </a:fld>
             <a:endParaRPr lang="en-US"/>
           </a:p>
@@ -7021,7 +7021,7 @@
           <a:p>
             <a:fld id="{0E13C4CA-1FE8-40BD-A7A3-1B8DF1413C47}" type="datetimeFigureOut">
               <a:rPr lang="en-US" smtClean="0"/>
-              <a:t>04-May-22</a:t>
+              <a:t>12-May-22</a:t>
             </a:fld>
             <a:endParaRPr lang="en-US"/>
           </a:p>
@@ -7332,7 +7332,7 @@
           <a:p>
             <a:fld id="{0E13C4CA-1FE8-40BD-A7A3-1B8DF1413C47}" type="datetimeFigureOut">
               <a:rPr lang="en-US" smtClean="0"/>
-              <a:t>04-May-22</a:t>
+              <a:t>12-May-22</a:t>
             </a:fld>
             <a:endParaRPr lang="en-US"/>
           </a:p>
@@ -7620,7 +7620,7 @@
           <a:p>
             <a:fld id="{0E13C4CA-1FE8-40BD-A7A3-1B8DF1413C47}" type="datetimeFigureOut">
               <a:rPr lang="en-US" smtClean="0"/>
-              <a:t>04-May-22</a:t>
+              <a:t>12-May-22</a:t>
             </a:fld>
             <a:endParaRPr lang="en-US"/>
           </a:p>
@@ -7861,7 +7861,7 @@
           <a:p>
             <a:fld id="{0E13C4CA-1FE8-40BD-A7A3-1B8DF1413C47}" type="datetimeFigureOut">
               <a:rPr lang="en-US" smtClean="0"/>
-              <a:t>04-May-22</a:t>
+              <a:t>12-May-22</a:t>
             </a:fld>
             <a:endParaRPr lang="en-US"/>
           </a:p>
@@ -15911,48 +15911,6 @@
           </a:xfrm>
         </p:spPr>
       </p:pic>
-      <p:sp>
-        <p:nvSpPr>
-          <p:cNvPr id="6" name="TextBox 5">
-            <a:extLst>
-              <a:ext uri="{FF2B5EF4-FFF2-40B4-BE49-F238E27FC236}">
-                <a16:creationId xmlns:a16="http://schemas.microsoft.com/office/drawing/2014/main" id="{264E6029-EA7B-B022-0CDA-6E64B1BE4551}"/>
-              </a:ext>
-            </a:extLst>
-          </p:cNvPr>
-          <p:cNvSpPr txBox="1"/>
-          <p:nvPr/>
-        </p:nvSpPr>
-        <p:spPr>
-          <a:xfrm>
-            <a:off x="3048000" y="3105835"/>
-            <a:ext cx="6096000" cy="646331"/>
-          </a:xfrm>
-          <a:prstGeom prst="rect">
-            <a:avLst/>
-          </a:prstGeom>
-          <a:noFill/>
-        </p:spPr>
-        <p:txBody>
-          <a:bodyPr wrap="square">
-            <a:spAutoFit/>
-          </a:bodyPr>
-          <a:lstStyle/>
-          <a:p>
-            <a:endParaRPr lang="en-US" dirty="0">
-              <a:hlinkClick r:id="rId4"/>
-            </a:endParaRPr>
-          </a:p>
-          <a:p>
-            <a:r>
-              <a:rPr lang="en-US" dirty="0">
-                <a:hlinkClick r:id="rId4"/>
-              </a:rPr>
-              <a:t>Connected devices</a:t>
-            </a:r>
-          </a:p>
-        </p:txBody>
-      </p:sp>
     </p:spTree>
     <p:extLst>
       <p:ext uri="{BB962C8B-B14F-4D97-AF65-F5344CB8AC3E}">

</xml_diff>